<commit_message>
Updated demo.pptx to the recent changes
</commit_message>
<xml_diff>
--- a/demo.pptx
+++ b/demo.pptx
@@ -13,7 +13,6 @@
     <p:sldId id="260" r:id="rId7"/>
     <p:sldId id="262" r:id="rId8"/>
     <p:sldId id="263" r:id="rId9"/>
-    <p:sldId id="264" r:id="rId10"/>
   </p:sldIdLst>
   <p:sldSz cx="12192000" cy="6858000"/>
   <p:notesSz cx="6858000" cy="9144000"/>
@@ -112,6 +111,11 @@
       </a:defRPr>
     </a:lvl9pPr>
   </p:defaultTextStyle>
+  <p:extLst>
+    <p:ext uri="{EFAFB233-063F-42B5-8137-9DF3F51BA10A}">
+      <p15:sldGuideLst xmlns:p15="http://schemas.microsoft.com/office/powerpoint/2012/main"/>
+    </p:ext>
+  </p:extLst>
 </p:presentation>
 </file>
 
@@ -278,7 +282,7 @@
           <a:p>
             <a:fld id="{124220A6-2A88-C149-847D-39239EE87405}" type="datetimeFigureOut">
               <a:rPr lang="en-DE" smtClean="0"/>
-              <a:t>17.08.22</a:t>
+              <a:t>10.01.23</a:t>
             </a:fld>
             <a:endParaRPr lang="en-DE"/>
           </a:p>
@@ -448,7 +452,7 @@
           <a:p>
             <a:fld id="{124220A6-2A88-C149-847D-39239EE87405}" type="datetimeFigureOut">
               <a:rPr lang="en-DE" smtClean="0"/>
-              <a:t>17.08.22</a:t>
+              <a:t>10.01.23</a:t>
             </a:fld>
             <a:endParaRPr lang="en-DE"/>
           </a:p>
@@ -628,7 +632,7 @@
           <a:p>
             <a:fld id="{124220A6-2A88-C149-847D-39239EE87405}" type="datetimeFigureOut">
               <a:rPr lang="en-DE" smtClean="0"/>
-              <a:t>17.08.22</a:t>
+              <a:t>10.01.23</a:t>
             </a:fld>
             <a:endParaRPr lang="en-DE"/>
           </a:p>
@@ -798,7 +802,7 @@
           <a:p>
             <a:fld id="{124220A6-2A88-C149-847D-39239EE87405}" type="datetimeFigureOut">
               <a:rPr lang="en-DE" smtClean="0"/>
-              <a:t>17.08.22</a:t>
+              <a:t>10.01.23</a:t>
             </a:fld>
             <a:endParaRPr lang="en-DE"/>
           </a:p>
@@ -1066,7 +1070,7 @@
           <a:p>
             <a:fld id="{124220A6-2A88-C149-847D-39239EE87405}" type="datetimeFigureOut">
               <a:rPr lang="en-DE" smtClean="0"/>
-              <a:t>17.08.22</a:t>
+              <a:t>10.01.23</a:t>
             </a:fld>
             <a:endParaRPr lang="en-DE"/>
           </a:p>
@@ -1298,7 +1302,7 @@
           <a:p>
             <a:fld id="{124220A6-2A88-C149-847D-39239EE87405}" type="datetimeFigureOut">
               <a:rPr lang="en-DE" smtClean="0"/>
-              <a:t>17.08.22</a:t>
+              <a:t>10.01.23</a:t>
             </a:fld>
             <a:endParaRPr lang="en-DE"/>
           </a:p>
@@ -1657,7 +1661,7 @@
           <a:p>
             <a:fld id="{124220A6-2A88-C149-847D-39239EE87405}" type="datetimeFigureOut">
               <a:rPr lang="en-DE" smtClean="0"/>
-              <a:t>17.08.22</a:t>
+              <a:t>10.01.23</a:t>
             </a:fld>
             <a:endParaRPr lang="en-DE"/>
           </a:p>
@@ -1798,7 +1802,7 @@
           <a:p>
             <a:fld id="{124220A6-2A88-C149-847D-39239EE87405}" type="datetimeFigureOut">
               <a:rPr lang="en-DE" smtClean="0"/>
-              <a:t>17.08.22</a:t>
+              <a:t>10.01.23</a:t>
             </a:fld>
             <a:endParaRPr lang="en-DE"/>
           </a:p>
@@ -1893,7 +1897,7 @@
           <a:p>
             <a:fld id="{124220A6-2A88-C149-847D-39239EE87405}" type="datetimeFigureOut">
               <a:rPr lang="en-DE" smtClean="0"/>
-              <a:t>17.08.22</a:t>
+              <a:t>10.01.23</a:t>
             </a:fld>
             <a:endParaRPr lang="en-DE"/>
           </a:p>
@@ -2250,7 +2254,7 @@
           <a:p>
             <a:fld id="{124220A6-2A88-C149-847D-39239EE87405}" type="datetimeFigureOut">
               <a:rPr lang="en-DE" smtClean="0"/>
-              <a:t>17.08.22</a:t>
+              <a:t>10.01.23</a:t>
             </a:fld>
             <a:endParaRPr lang="en-DE"/>
           </a:p>
@@ -2607,7 +2611,7 @@
           <a:p>
             <a:fld id="{124220A6-2A88-C149-847D-39239EE87405}" type="datetimeFigureOut">
               <a:rPr lang="en-DE" smtClean="0"/>
-              <a:t>17.08.22</a:t>
+              <a:t>10.01.23</a:t>
             </a:fld>
             <a:endParaRPr lang="en-DE"/>
           </a:p>
@@ -2849,7 +2853,7 @@
           <a:p>
             <a:fld id="{124220A6-2A88-C149-847D-39239EE87405}" type="datetimeFigureOut">
               <a:rPr lang="en-DE" smtClean="0"/>
-              <a:t>17.08.22</a:t>
+              <a:t>10.01.23</a:t>
             </a:fld>
             <a:endParaRPr lang="en-DE"/>
           </a:p>
@@ -3333,7 +3337,7 @@
             </a:br>
             <a:r>
               <a:rPr lang="en-DE" dirty="0"/>
-              <a:t>Veracode Node Packager</a:t>
+              <a:t>Veracode JavaSCRIPT Packager</a:t>
             </a:r>
           </a:p>
         </p:txBody>
@@ -3458,32 +3462,22 @@
             </a:r>
           </a:p>
           <a:p>
+            <a:endParaRPr lang="en-DE" dirty="0"/>
+          </a:p>
+          <a:p>
             <a:r>
               <a:rPr lang="en-DE" dirty="0"/>
-              <a:t>Attempts to automate away common struggles when uploading Node.js applications to Veracode Static Analysis</a:t>
-            </a:r>
+              <a:t>Attempts to automate away common struggles when uploading JavaScript (i.e., Node, Angular, Vue, React) applications to Veracode Static Analysis</a:t>
+            </a:r>
+          </a:p>
+          <a:p>
+            <a:endParaRPr lang="en-DE" dirty="0"/>
           </a:p>
           <a:p>
             <a:r>
               <a:rPr lang="en-DE" dirty="0"/>
-              <a:t>Packages a Node.js application and outputs a Zip archive</a:t>
-            </a:r>
-          </a:p>
-          <a:p>
-            <a:r>
-              <a:rPr lang="en-DE" dirty="0"/>
-              <a:t>May also work with JavaScript frontend frameworks (like Angular, React, etc.)</a:t>
-            </a:r>
-          </a:p>
-          <a:p>
-            <a:pPr lvl="1"/>
-            <a:r>
-              <a:rPr lang="en-DE" dirty="0"/>
-              <a:t>However, this has not been tested!</a:t>
-            </a:r>
-          </a:p>
-          <a:p>
-            <a:endParaRPr lang="en-DE" dirty="0"/>
+              <a:t>Packages a JavaScript application and outputs a Zip archive</a:t>
+            </a:r>
           </a:p>
           <a:p>
             <a:endParaRPr lang="en-DE" dirty="0"/>
@@ -3737,37 +3731,21 @@
             <a:pPr lvl="1"/>
             <a:r>
               <a:rPr lang="en-DE" dirty="0"/>
-              <a:t>Check if `/dist` folder exists – indicates minified JavaScript (we don’t want that!)</a:t>
+              <a:t>Check if a file for SCA exists (e.g. `package-lock.json`)</a:t>
             </a:r>
           </a:p>
           <a:p>
             <a:pPr lvl="1"/>
             <a:r>
-              <a:rPr lang="en-DE" dirty="0"/>
-              <a:t>Check if `/public` exists – </a:t>
-            </a:r>
-            <a:r>
               <a:rPr lang="en-GB" dirty="0"/>
-              <a:t>may contain resources that are not part of the actual 1st party source code</a:t>
+              <a:t>Check for .map files (indicate minified JS)</a:t>
             </a:r>
             <a:endParaRPr lang="en-DE" dirty="0"/>
           </a:p>
           <a:p>
-            <a:pPr lvl="1"/>
-            <a:r>
-              <a:rPr lang="en-DE" dirty="0"/>
-              <a:t>Check if a `package-lock.json` exists (required for Veracode SCA, if NPM is used)</a:t>
-            </a:r>
-          </a:p>
-          <a:p>
-            <a:pPr lvl="1"/>
-            <a:r>
-              <a:rPr lang="en-DE" dirty="0"/>
-              <a:t>…</a:t>
-            </a:r>
-          </a:p>
-          <a:p>
-            <a:pPr lvl="1"/>
+            <a:pPr marL="228600" lvl="1" indent="0">
+              <a:buNone/>
+            </a:pPr>
             <a:endParaRPr lang="en-DE" dirty="0"/>
           </a:p>
           <a:p>
@@ -4066,7 +4044,7 @@
         </p:spPr>
         <p:txBody>
           <a:bodyPr>
-            <a:normAutofit fontScale="77500" lnSpcReduction="20000"/>
+            <a:normAutofit/>
           </a:bodyPr>
           <a:lstStyle/>
           <a:p>
@@ -4086,9 +4064,12 @@
               <a:rPr lang="en-GB" dirty="0">
                 <a:hlinkClick r:id="rId2"/>
               </a:rPr>
-              <a:t>https://github.com/fw10/veracode-node-packager</a:t>
-            </a:r>
-            <a:endParaRPr lang="en-GB" dirty="0"/>
+              <a:t>https://github.com/fw10/veracode-javascript-packager</a:t>
+            </a:r>
+            <a:r>
+              <a:rPr lang="en-GB" dirty="0"/>
+              <a:t> </a:t>
+            </a:r>
           </a:p>
           <a:p>
             <a:pPr lvl="1"/>
@@ -4098,6 +4079,10 @@
             </a:r>
           </a:p>
           <a:p>
+            <a:pPr lvl="1"/>
+            <a:endParaRPr lang="en-GB" dirty="0"/>
+          </a:p>
+          <a:p>
             <a:r>
               <a:rPr lang="en-GB" b="1" u="sng" dirty="0"/>
               <a:t>How to Run it:</a:t>
@@ -4123,72 +4108,17 @@
             <a:pPr lvl="1"/>
             <a:r>
               <a:rPr lang="en-GB" dirty="0"/>
-              <a:t>The required flags are:</a:t>
-            </a:r>
-          </a:p>
-          <a:p>
-            <a:pPr lvl="2"/>
+              <a:t>The flags are documented here: </a:t>
+            </a:r>
+            <a:r>
+              <a:rPr lang="en-GB" dirty="0">
+                <a:hlinkClick r:id="rId3"/>
+              </a:rPr>
+              <a:t>https://github.com/fw10/veracode-javascript-packager#how-to-use-</a:t>
+            </a:r>
             <a:r>
               <a:rPr lang="en-GB" dirty="0"/>
-              <a:t>`-source`:  The path of the Node.js app you want to package (default "sample-node-project")</a:t>
-            </a:r>
-          </a:p>
-          <a:p>
-            <a:pPr lvl="2"/>
-            <a:r>
-              <a:rPr lang="en-GB" dirty="0"/>
-              <a:t>`-target`: The path where you want the `</a:t>
-            </a:r>
-            <a:r>
-              <a:rPr lang="en-GB" dirty="0" err="1"/>
-              <a:t>vc-output.zip</a:t>
-            </a:r>
-            <a:r>
-              <a:rPr lang="en-GB" dirty="0"/>
-              <a:t>` to be stored to (default ".")</a:t>
-            </a:r>
-          </a:p>
-          <a:p>
-            <a:pPr lvl="2"/>
-            <a:r>
-              <a:rPr lang="en-GB" dirty="0"/>
-              <a:t>`-tests`:  The path that contains your Node.js test files (relative to the source) (default "test")</a:t>
-            </a:r>
-          </a:p>
-          <a:p>
-            <a:r>
-              <a:rPr lang="en-GB" b="1" u="sng" dirty="0"/>
-              <a:t>Example Usage:</a:t>
-            </a:r>
-          </a:p>
-          <a:p>
-            <a:pPr lvl="1"/>
-            <a:r>
-              <a:rPr lang="en-GB" dirty="0"/>
-              <a:t>` ./</a:t>
-            </a:r>
-            <a:r>
-              <a:rPr lang="en-GB" dirty="0" err="1"/>
-              <a:t>vc</a:t>
-            </a:r>
-            <a:r>
-              <a:rPr lang="en-GB" dirty="0"/>
-              <a:t>-node-packager -source sample-node-project -target . -tests test`</a:t>
-            </a:r>
-          </a:p>
-          <a:p>
-            <a:pPr lvl="1"/>
-            <a:r>
-              <a:rPr lang="en-GB" dirty="0"/>
-              <a:t>This packages up a Node.js application in the folder `sample-node-project`, puts the `</a:t>
-            </a:r>
-            <a:r>
-              <a:rPr lang="en-GB" dirty="0" err="1"/>
-              <a:t>vc-output.zip</a:t>
-            </a:r>
-            <a:r>
-              <a:rPr lang="en-GB" dirty="0"/>
-              <a:t>` in the current directory, and ignores the `test` directory within `sample-node-project`	</a:t>
+              <a:t> </a:t>
             </a:r>
           </a:p>
         </p:txBody>
@@ -4287,7 +4217,7 @@
               <a:rPr lang="en-GB" dirty="0">
                 <a:hlinkClick r:id="rId2"/>
               </a:rPr>
-              <a:t>https://github.com/fw10/veracode-node-packager/tree/main/sample-node-project</a:t>
+              <a:t>https://github.com/fw10/veracode-javascript-packager/tree/main/sample-projects/sample-node-project</a:t>
             </a:r>
             <a:r>
               <a:rPr lang="en-GB" dirty="0"/>
@@ -4381,15 +4311,7 @@
             </a:pPr>
             <a:r>
               <a:rPr lang="en-GB" b="1" dirty="0"/>
-              <a:t>Before (with `</a:t>
-            </a:r>
-            <a:r>
-              <a:rPr lang="en-GB" b="1" dirty="0" err="1"/>
-              <a:t>node_modules</a:t>
-            </a:r>
-            <a:r>
-              <a:rPr lang="en-GB" b="1" dirty="0"/>
-              <a:t>` collapsed):</a:t>
+              <a:t>Before (with some folders collapsed):</a:t>
             </a:r>
             <a:endParaRPr lang="en-DE" b="1" dirty="0"/>
           </a:p>
@@ -4411,7 +4333,7 @@
         </p:nvSpPr>
         <p:spPr>
           <a:xfrm>
-            <a:off x="7821171" y="213042"/>
+            <a:off x="8835932" y="213041"/>
             <a:ext cx="1158835" cy="790956"/>
           </a:xfrm>
           <a:prstGeom prst="rect">
@@ -4643,10 +4565,10 @@
       </p:sp>
       <p:pic>
         <p:nvPicPr>
-          <p:cNvPr id="8" name="Picture 7">
+          <p:cNvPr id="10" name="Picture 9">
             <a:extLst>
               <a:ext uri="{FF2B5EF4-FFF2-40B4-BE49-F238E27FC236}">
-                <a16:creationId xmlns:a16="http://schemas.microsoft.com/office/drawing/2014/main" id="{7BFD811D-7777-3DC0-2FFD-EEA5CA52974F}"/>
+                <a16:creationId xmlns:a16="http://schemas.microsoft.com/office/drawing/2014/main" id="{40D1F1A9-3882-ABB4-B071-48748E4F6871}"/>
               </a:ext>
             </a:extLst>
           </p:cNvPr>
@@ -4663,67 +4585,7 @@
         </p:blipFill>
         <p:spPr>
           <a:xfrm>
-            <a:off x="1369474" y="695855"/>
-            <a:ext cx="2399637" cy="5939374"/>
-          </a:xfrm>
-          <a:prstGeom prst="rect">
-            <a:avLst/>
-          </a:prstGeom>
-        </p:spPr>
-      </p:pic>
-      <p:pic>
-        <p:nvPicPr>
-          <p:cNvPr id="9" name="Picture 8">
-            <a:extLst>
-              <a:ext uri="{FF2B5EF4-FFF2-40B4-BE49-F238E27FC236}">
-                <a16:creationId xmlns:a16="http://schemas.microsoft.com/office/drawing/2014/main" id="{9B49F9E7-4F6C-EB84-3B2E-945421AC431C}"/>
-              </a:ext>
-            </a:extLst>
-          </p:cNvPr>
-          <p:cNvPicPr>
-            <a:picLocks noChangeAspect="1"/>
-          </p:cNvPicPr>
-          <p:nvPr/>
-        </p:nvPicPr>
-        <p:blipFill>
-          <a:blip r:embed="rId3"/>
-          <a:stretch>
-            <a:fillRect/>
-          </a:stretch>
-        </p:blipFill>
-        <p:spPr>
-          <a:xfrm>
-            <a:off x="6886190" y="3306337"/>
-            <a:ext cx="3073400" cy="3136900"/>
-          </a:xfrm>
-          <a:prstGeom prst="rect">
-            <a:avLst/>
-          </a:prstGeom>
-        </p:spPr>
-      </p:pic>
-      <p:pic>
-        <p:nvPicPr>
-          <p:cNvPr id="10" name="Picture 9">
-            <a:extLst>
-              <a:ext uri="{FF2B5EF4-FFF2-40B4-BE49-F238E27FC236}">
-                <a16:creationId xmlns:a16="http://schemas.microsoft.com/office/drawing/2014/main" id="{40D1F1A9-3882-ABB4-B071-48748E4F6871}"/>
-              </a:ext>
-            </a:extLst>
-          </p:cNvPr>
-          <p:cNvPicPr>
-            <a:picLocks noChangeAspect="1"/>
-          </p:cNvPicPr>
-          <p:nvPr/>
-        </p:nvPicPr>
-        <p:blipFill>
-          <a:blip r:embed="rId4"/>
-          <a:stretch>
-            <a:fillRect/>
-          </a:stretch>
-        </p:blipFill>
-        <p:spPr>
-          <a:xfrm>
-            <a:off x="7567518" y="755999"/>
+            <a:off x="8757425" y="767386"/>
             <a:ext cx="1524000" cy="1460500"/>
           </a:xfrm>
           <a:prstGeom prst="rect">
@@ -4747,8 +4609,8 @@
         </p:nvCxnSpPr>
         <p:spPr>
           <a:xfrm flipV="1">
-            <a:off x="4034661" y="1497636"/>
-            <a:ext cx="3267307" cy="200722"/>
+            <a:off x="4280364" y="1497636"/>
+            <a:ext cx="4250319" cy="200722"/>
           </a:xfrm>
           <a:prstGeom prst="straightConnector1">
             <a:avLst/>
@@ -4784,13 +4646,14 @@
           <p:cNvCxnSpPr>
             <a:cxnSpLocks/>
             <a:stCxn id="10" idx="2"/>
+            <a:endCxn id="2" idx="0"/>
           </p:cNvCxnSpPr>
           <p:nvPr/>
         </p:nvCxnSpPr>
         <p:spPr>
           <a:xfrm>
-            <a:off x="8329518" y="2216499"/>
-            <a:ext cx="0" cy="995052"/>
+            <a:off x="9519425" y="2227886"/>
+            <a:ext cx="0" cy="796572"/>
           </a:xfrm>
           <a:prstGeom prst="line">
             <a:avLst/>
@@ -4814,129 +4677,70 @@
           </a:fontRef>
         </p:style>
       </p:cxnSp>
+      <p:pic>
+        <p:nvPicPr>
+          <p:cNvPr id="2" name="Picture 1">
+            <a:extLst>
+              <a:ext uri="{FF2B5EF4-FFF2-40B4-BE49-F238E27FC236}">
+                <a16:creationId xmlns:a16="http://schemas.microsoft.com/office/drawing/2014/main" id="{4F6EA08B-6B4D-26CF-A486-4912C1B91A62}"/>
+              </a:ext>
+            </a:extLst>
+          </p:cNvPr>
+          <p:cNvPicPr>
+            <a:picLocks noChangeAspect="1"/>
+          </p:cNvPicPr>
+          <p:nvPr/>
+        </p:nvPicPr>
+        <p:blipFill>
+          <a:blip r:embed="rId3"/>
+          <a:stretch>
+            <a:fillRect/>
+          </a:stretch>
+        </p:blipFill>
+        <p:spPr>
+          <a:xfrm>
+            <a:off x="8058925" y="3024458"/>
+            <a:ext cx="2921000" cy="3708400"/>
+          </a:xfrm>
+          <a:prstGeom prst="rect">
+            <a:avLst/>
+          </a:prstGeom>
+        </p:spPr>
+      </p:pic>
+      <p:pic>
+        <p:nvPicPr>
+          <p:cNvPr id="11" name="Picture 10">
+            <a:extLst>
+              <a:ext uri="{FF2B5EF4-FFF2-40B4-BE49-F238E27FC236}">
+                <a16:creationId xmlns:a16="http://schemas.microsoft.com/office/drawing/2014/main" id="{88242DD9-8F68-51DF-6D9A-819E78AD904D}"/>
+              </a:ext>
+            </a:extLst>
+          </p:cNvPr>
+          <p:cNvPicPr>
+            <a:picLocks noChangeAspect="1"/>
+          </p:cNvPicPr>
+          <p:nvPr/>
+        </p:nvPicPr>
+        <p:blipFill>
+          <a:blip r:embed="rId4"/>
+          <a:stretch>
+            <a:fillRect/>
+          </a:stretch>
+        </p:blipFill>
+        <p:spPr>
+          <a:xfrm>
+            <a:off x="1713304" y="755998"/>
+            <a:ext cx="2419772" cy="5568950"/>
+          </a:xfrm>
+          <a:prstGeom prst="rect">
+            <a:avLst/>
+          </a:prstGeom>
+        </p:spPr>
+      </p:pic>
     </p:spTree>
     <p:extLst>
       <p:ext uri="{BB962C8B-B14F-4D97-AF65-F5344CB8AC3E}">
         <p14:creationId xmlns:p14="http://schemas.microsoft.com/office/powerpoint/2010/main" val="2300650668"/>
-      </p:ext>
-    </p:extLst>
-  </p:cSld>
-  <p:clrMapOvr>
-    <a:masterClrMapping/>
-  </p:clrMapOvr>
-</p:sld>
-</file>
-
-<file path=ppt/slides/slide9.xml><?xml version="1.0" encoding="utf-8"?>
-<p:sld xmlns:a="http://schemas.openxmlformats.org/drawingml/2006/main" xmlns:r="http://schemas.openxmlformats.org/officeDocument/2006/relationships" xmlns:p="http://schemas.openxmlformats.org/presentationml/2006/main">
-  <p:cSld>
-    <p:spTree>
-      <p:nvGrpSpPr>
-        <p:cNvPr id="1" name=""/>
-        <p:cNvGrpSpPr/>
-        <p:nvPr/>
-      </p:nvGrpSpPr>
-      <p:grpSpPr>
-        <a:xfrm>
-          <a:off x="0" y="0"/>
-          <a:ext cx="0" cy="0"/>
-          <a:chOff x="0" y="0"/>
-          <a:chExt cx="0" cy="0"/>
-        </a:xfrm>
-      </p:grpSpPr>
-      <p:sp>
-        <p:nvSpPr>
-          <p:cNvPr id="2" name="Title 1">
-            <a:extLst>
-              <a:ext uri="{FF2B5EF4-FFF2-40B4-BE49-F238E27FC236}">
-                <a16:creationId xmlns:a16="http://schemas.microsoft.com/office/drawing/2014/main" id="{29EA9589-58CE-CFBF-0E32-756FBBFD3236}"/>
-              </a:ext>
-            </a:extLst>
-          </p:cNvPr>
-          <p:cNvSpPr>
-            <a:spLocks noGrp="1"/>
-          </p:cNvSpPr>
-          <p:nvPr>
-            <p:ph type="title"/>
-          </p:nvPr>
-        </p:nvSpPr>
-        <p:spPr/>
-        <p:txBody>
-          <a:bodyPr/>
-          <a:lstStyle/>
-          <a:p>
-            <a:r>
-              <a:rPr lang="en-DE" dirty="0"/>
-              <a:t>Future Considerations</a:t>
-            </a:r>
-          </a:p>
-        </p:txBody>
-      </p:sp>
-      <p:sp>
-        <p:nvSpPr>
-          <p:cNvPr id="3" name="Content Placeholder 2">
-            <a:extLst>
-              <a:ext uri="{FF2B5EF4-FFF2-40B4-BE49-F238E27FC236}">
-                <a16:creationId xmlns:a16="http://schemas.microsoft.com/office/drawing/2014/main" id="{CE899AF1-9875-EFC0-D90E-B520343504BA}"/>
-              </a:ext>
-            </a:extLst>
-          </p:cNvPr>
-          <p:cNvSpPr>
-            <a:spLocks noGrp="1"/>
-          </p:cNvSpPr>
-          <p:nvPr>
-            <p:ph idx="1"/>
-          </p:nvPr>
-        </p:nvSpPr>
-        <p:spPr>
-          <a:xfrm>
-            <a:off x="2231136" y="2638044"/>
-            <a:ext cx="7729728" cy="3740454"/>
-          </a:xfrm>
-        </p:spPr>
-        <p:txBody>
-          <a:bodyPr>
-            <a:normAutofit/>
-          </a:bodyPr>
-          <a:lstStyle/>
-          <a:p>
-            <a:r>
-              <a:rPr lang="en-GB" dirty="0"/>
-              <a:t>Maybe entirely omit `/public` </a:t>
-            </a:r>
-          </a:p>
-          <a:p>
-            <a:r>
-              <a:rPr lang="en-GB" dirty="0"/>
-              <a:t>Maybe entirely omit `/</a:t>
-            </a:r>
-            <a:r>
-              <a:rPr lang="en-GB" dirty="0" err="1"/>
-              <a:t>dist</a:t>
-            </a:r>
-            <a:r>
-              <a:rPr lang="en-GB" dirty="0"/>
-              <a:t>`</a:t>
-            </a:r>
-          </a:p>
-          <a:p>
-            <a:r>
-              <a:rPr lang="en-GB" dirty="0"/>
-              <a:t>Maybe omit all `.map` files </a:t>
-            </a:r>
-          </a:p>
-          <a:p>
-            <a:r>
-              <a:rPr lang="en-GB" dirty="0"/>
-              <a:t>Add this tool to the NPM Registry</a:t>
-            </a:r>
-          </a:p>
-        </p:txBody>
-      </p:sp>
-    </p:spTree>
-    <p:extLst>
-      <p:ext uri="{BB962C8B-B14F-4D97-AF65-F5344CB8AC3E}">
-        <p14:creationId xmlns:p14="http://schemas.microsoft.com/office/powerpoint/2010/main" val="1231095990"/>
       </p:ext>
     </p:extLst>
   </p:cSld>

</xml_diff>